<commit_message>
added department to users and cookies
</commit_message>
<xml_diff>
--- a/background_data/HosptalHeirarchy.pptx
+++ b/background_data/HosptalHeirarchy.pptx
@@ -64,7 +64,7 @@
         <p:spPr>
           <a:xfrm>
             <a:off x="1523520" y="1122120"/>
-            <a:ext cx="9143280" cy="2386800"/>
+            <a:ext cx="9142920" cy="2386440"/>
           </a:xfrm>
           <a:prstGeom prst="rect">
             <a:avLst/>
@@ -95,7 +95,7 @@
         <p:spPr>
           <a:xfrm>
             <a:off x="609120" y="1604160"/>
-            <a:ext cx="10972440" cy="1896840"/>
+            <a:ext cx="10972080" cy="1896840"/>
           </a:xfrm>
           <a:prstGeom prst="rect">
             <a:avLst/>
@@ -125,7 +125,7 @@
         <p:spPr>
           <a:xfrm>
             <a:off x="609120" y="3681720"/>
-            <a:ext cx="10972440" cy="1896840"/>
+            <a:ext cx="10972080" cy="1896840"/>
           </a:xfrm>
           <a:prstGeom prst="rect">
             <a:avLst/>
@@ -177,7 +177,7 @@
         <p:spPr>
           <a:xfrm>
             <a:off x="1523520" y="1122120"/>
-            <a:ext cx="9143280" cy="2386800"/>
+            <a:ext cx="9142920" cy="2386440"/>
           </a:xfrm>
           <a:prstGeom prst="rect">
             <a:avLst/>
@@ -350,7 +350,7 @@
         <p:spPr>
           <a:xfrm>
             <a:off x="1523520" y="1122120"/>
-            <a:ext cx="9143280" cy="2386800"/>
+            <a:ext cx="9142920" cy="2386440"/>
           </a:xfrm>
           <a:prstGeom prst="rect">
             <a:avLst/>
@@ -381,7 +381,7 @@
         <p:spPr>
           <a:xfrm>
             <a:off x="609120" y="1604160"/>
-            <a:ext cx="3533040" cy="1896840"/>
+            <a:ext cx="3532680" cy="1896840"/>
           </a:xfrm>
           <a:prstGeom prst="rect">
             <a:avLst/>
@@ -410,8 +410,8 @@
         </p:nvSpPr>
         <p:spPr>
           <a:xfrm>
-            <a:off x="4319280" y="1604160"/>
-            <a:ext cx="3533040" cy="1896840"/>
+            <a:off x="4318920" y="1604160"/>
+            <a:ext cx="3532680" cy="1896840"/>
           </a:xfrm>
           <a:prstGeom prst="rect">
             <a:avLst/>
@@ -440,8 +440,8 @@
         </p:nvSpPr>
         <p:spPr>
           <a:xfrm>
-            <a:off x="8029440" y="1604160"/>
-            <a:ext cx="3533040" cy="1896840"/>
+            <a:off x="8028360" y="1604160"/>
+            <a:ext cx="3532680" cy="1896840"/>
           </a:xfrm>
           <a:prstGeom prst="rect">
             <a:avLst/>
@@ -471,7 +471,7 @@
         <p:spPr>
           <a:xfrm>
             <a:off x="609120" y="3681720"/>
-            <a:ext cx="3533040" cy="1896840"/>
+            <a:ext cx="3532680" cy="1896840"/>
           </a:xfrm>
           <a:prstGeom prst="rect">
             <a:avLst/>
@@ -500,8 +500,8 @@
         </p:nvSpPr>
         <p:spPr>
           <a:xfrm>
-            <a:off x="4319280" y="3681720"/>
-            <a:ext cx="3533040" cy="1896840"/>
+            <a:off x="4318920" y="3681720"/>
+            <a:ext cx="3532680" cy="1896840"/>
           </a:xfrm>
           <a:prstGeom prst="rect">
             <a:avLst/>
@@ -530,8 +530,8 @@
         </p:nvSpPr>
         <p:spPr>
           <a:xfrm>
-            <a:off x="8029440" y="3681720"/>
-            <a:ext cx="3533040" cy="1896840"/>
+            <a:off x="8028360" y="3681720"/>
+            <a:ext cx="3532680" cy="1896840"/>
           </a:xfrm>
           <a:prstGeom prst="rect">
             <a:avLst/>
@@ -583,7 +583,7 @@
         <p:spPr>
           <a:xfrm>
             <a:off x="1523520" y="1122120"/>
-            <a:ext cx="9143280" cy="2386800"/>
+            <a:ext cx="9142920" cy="2386440"/>
           </a:xfrm>
           <a:prstGeom prst="rect">
             <a:avLst/>
@@ -614,7 +614,7 @@
         <p:spPr>
           <a:xfrm>
             <a:off x="609120" y="1604160"/>
-            <a:ext cx="10972440" cy="3977280"/>
+            <a:ext cx="10972080" cy="3976920"/>
           </a:xfrm>
           <a:prstGeom prst="rect">
             <a:avLst/>
@@ -667,7 +667,7 @@
         <p:spPr>
           <a:xfrm>
             <a:off x="1523520" y="1122120"/>
-            <a:ext cx="9143280" cy="2386800"/>
+            <a:ext cx="9142920" cy="2386440"/>
           </a:xfrm>
           <a:prstGeom prst="rect">
             <a:avLst/>
@@ -698,7 +698,7 @@
         <p:spPr>
           <a:xfrm>
             <a:off x="609120" y="1604160"/>
-            <a:ext cx="10972440" cy="3977280"/>
+            <a:ext cx="10972080" cy="3976920"/>
           </a:xfrm>
           <a:prstGeom prst="rect">
             <a:avLst/>
@@ -750,7 +750,7 @@
         <p:spPr>
           <a:xfrm>
             <a:off x="1523520" y="1122120"/>
-            <a:ext cx="9143280" cy="2386800"/>
+            <a:ext cx="9142920" cy="2386440"/>
           </a:xfrm>
           <a:prstGeom prst="rect">
             <a:avLst/>
@@ -781,7 +781,7 @@
         <p:spPr>
           <a:xfrm>
             <a:off x="609120" y="1604160"/>
-            <a:ext cx="5354280" cy="3977280"/>
+            <a:ext cx="5354280" cy="3976920"/>
           </a:xfrm>
           <a:prstGeom prst="rect">
             <a:avLst/>
@@ -811,7 +811,7 @@
         <p:spPr>
           <a:xfrm>
             <a:off x="6231600" y="1604160"/>
-            <a:ext cx="5354280" cy="3977280"/>
+            <a:ext cx="5354280" cy="3976920"/>
           </a:xfrm>
           <a:prstGeom prst="rect">
             <a:avLst/>
@@ -863,7 +863,7 @@
         <p:spPr>
           <a:xfrm>
             <a:off x="1523520" y="1122120"/>
-            <a:ext cx="9143280" cy="2386800"/>
+            <a:ext cx="9142920" cy="2386440"/>
           </a:xfrm>
           <a:prstGeom prst="rect">
             <a:avLst/>
@@ -916,7 +916,7 @@
         <p:spPr>
           <a:xfrm>
             <a:off x="1523520" y="1122120"/>
-            <a:ext cx="9143280" cy="11064960"/>
+            <a:ext cx="9142920" cy="11063520"/>
           </a:xfrm>
           <a:prstGeom prst="rect">
             <a:avLst/>
@@ -969,7 +969,7 @@
         <p:spPr>
           <a:xfrm>
             <a:off x="1523520" y="1122120"/>
-            <a:ext cx="9143280" cy="2386800"/>
+            <a:ext cx="9142920" cy="2386440"/>
           </a:xfrm>
           <a:prstGeom prst="rect">
             <a:avLst/>
@@ -1030,7 +1030,7 @@
         <p:spPr>
           <a:xfrm>
             <a:off x="6231600" y="1604160"/>
-            <a:ext cx="5354280" cy="3977280"/>
+            <a:ext cx="5354280" cy="3976920"/>
           </a:xfrm>
           <a:prstGeom prst="rect">
             <a:avLst/>
@@ -1112,7 +1112,7 @@
         <p:spPr>
           <a:xfrm>
             <a:off x="1523520" y="1122120"/>
-            <a:ext cx="9143280" cy="2386800"/>
+            <a:ext cx="9142920" cy="2386440"/>
           </a:xfrm>
           <a:prstGeom prst="rect">
             <a:avLst/>
@@ -1143,7 +1143,7 @@
         <p:spPr>
           <a:xfrm>
             <a:off x="609120" y="1604160"/>
-            <a:ext cx="5354280" cy="3977280"/>
+            <a:ext cx="5354280" cy="3976920"/>
           </a:xfrm>
           <a:prstGeom prst="rect">
             <a:avLst/>
@@ -1255,7 +1255,7 @@
         <p:spPr>
           <a:xfrm>
             <a:off x="1523520" y="1122120"/>
-            <a:ext cx="9143280" cy="2386800"/>
+            <a:ext cx="9142920" cy="2386440"/>
           </a:xfrm>
           <a:prstGeom prst="rect">
             <a:avLst/>
@@ -1346,7 +1346,7 @@
         <p:spPr>
           <a:xfrm>
             <a:off x="609120" y="3681720"/>
-            <a:ext cx="10972440" cy="1896840"/>
+            <a:ext cx="10972080" cy="1896840"/>
           </a:xfrm>
           <a:prstGeom prst="rect">
             <a:avLst/>
@@ -1405,7 +1405,7 @@
         <p:spPr>
           <a:xfrm>
             <a:off x="1523520" y="1122120"/>
-            <a:ext cx="9143280" cy="2386800"/>
+            <a:ext cx="9142920" cy="2386440"/>
           </a:xfrm>
           <a:prstGeom prst="rect">
             <a:avLst/>
@@ -1442,7 +1442,7 @@
         <p:spPr>
           <a:xfrm>
             <a:off x="609120" y="1604160"/>
-            <a:ext cx="10972440" cy="3977280"/>
+            <a:ext cx="10972080" cy="3976920"/>
           </a:xfrm>
           <a:prstGeom prst="rect">
             <a:avLst/>
@@ -1453,9 +1453,9 @@
             <a:normAutofit/>
           </a:bodyPr>
           <a:p>
-            <a:pPr marL="432000" indent="-324000">
+            <a:pPr marL="432000" indent="-324000" algn="ctr">
               <a:spcBef>
-                <a:spcPts val="1409"/>
+                <a:spcPts val="1417"/>
               </a:spcBef>
               <a:buClr>
                 <a:srgbClr val="000000"/>
@@ -1465,19 +1465,19 @@
               <a:buChar char=""/>
             </a:pPr>
             <a:r>
-              <a:rPr b="0" lang="en-US" sz="3200" spc="-1" strike="noStrike">
+              <a:rPr b="0" lang="en-US" sz="1800" spc="-1" strike="noStrike">
                 <a:latin typeface="Arial"/>
               </a:rPr>
               <a:t>Click to edit the outline text format</a:t>
             </a:r>
-            <a:endParaRPr b="0" lang="en-US" sz="3200" spc="-1" strike="noStrike">
+            <a:endParaRPr b="0" lang="en-US" sz="1800" spc="-1" strike="noStrike">
               <a:latin typeface="Arial"/>
             </a:endParaRPr>
           </a:p>
           <a:p>
-            <a:pPr lvl="1" marL="864000" indent="-324000">
+            <a:pPr lvl="1" marL="864000" indent="-324000" algn="ctr">
               <a:spcBef>
-                <a:spcPts val="1131"/>
+                <a:spcPts val="1134"/>
               </a:spcBef>
               <a:buClr>
                 <a:srgbClr val="000000"/>
@@ -1487,19 +1487,19 @@
               <a:buChar char=""/>
             </a:pPr>
             <a:r>
-              <a:rPr b="0" lang="en-US" sz="2800" spc="-1" strike="noStrike">
+              <a:rPr b="0" lang="en-US" sz="1800" spc="-1" strike="noStrike">
                 <a:latin typeface="Arial"/>
               </a:rPr>
               <a:t>Second Outline Level</a:t>
             </a:r>
-            <a:endParaRPr b="0" lang="en-US" sz="2800" spc="-1" strike="noStrike">
+            <a:endParaRPr b="0" lang="en-US" sz="1800" spc="-1" strike="noStrike">
               <a:latin typeface="Arial"/>
             </a:endParaRPr>
           </a:p>
           <a:p>
-            <a:pPr lvl="2" marL="1296000" indent="-288000">
+            <a:pPr lvl="2" marL="1296000" indent="-288000" algn="ctr">
               <a:spcBef>
-                <a:spcPts val="845"/>
+                <a:spcPts val="850"/>
               </a:spcBef>
               <a:buClr>
                 <a:srgbClr val="000000"/>
@@ -1509,19 +1509,19 @@
               <a:buChar char=""/>
             </a:pPr>
             <a:r>
-              <a:rPr b="0" lang="en-US" sz="2400" spc="-1" strike="noStrike">
+              <a:rPr b="0" lang="en-US" sz="1800" spc="-1" strike="noStrike">
                 <a:latin typeface="Arial"/>
               </a:rPr>
               <a:t>Third Outline Level</a:t>
             </a:r>
-            <a:endParaRPr b="0" lang="en-US" sz="2400" spc="-1" strike="noStrike">
+            <a:endParaRPr b="0" lang="en-US" sz="1800" spc="-1" strike="noStrike">
               <a:latin typeface="Arial"/>
             </a:endParaRPr>
           </a:p>
           <a:p>
-            <a:pPr lvl="3" marL="1728000" indent="-216000">
+            <a:pPr lvl="3" marL="1728000" indent="-216000" algn="ctr">
               <a:spcBef>
-                <a:spcPts val="564"/>
+                <a:spcPts val="567"/>
               </a:spcBef>
               <a:buClr>
                 <a:srgbClr val="000000"/>
@@ -1531,19 +1531,19 @@
               <a:buChar char=""/>
             </a:pPr>
             <a:r>
-              <a:rPr b="0" lang="en-US" sz="2000" spc="-1" strike="noStrike">
+              <a:rPr b="0" lang="en-US" sz="1800" spc="-1" strike="noStrike">
                 <a:latin typeface="Arial"/>
               </a:rPr>
               <a:t>Fourth Outline Level</a:t>
             </a:r>
-            <a:endParaRPr b="0" lang="en-US" sz="2000" spc="-1" strike="noStrike">
+            <a:endParaRPr b="0" lang="en-US" sz="1800" spc="-1" strike="noStrike">
               <a:latin typeface="Arial"/>
             </a:endParaRPr>
           </a:p>
           <a:p>
-            <a:pPr lvl="4" marL="2160000" indent="-216000">
+            <a:pPr lvl="4" marL="2160000" indent="-216000" algn="ctr">
               <a:spcBef>
-                <a:spcPts val="281"/>
+                <a:spcPts val="283"/>
               </a:spcBef>
               <a:buClr>
                 <a:srgbClr val="000000"/>
@@ -1553,19 +1553,19 @@
               <a:buChar char=""/>
             </a:pPr>
             <a:r>
-              <a:rPr b="0" lang="en-US" sz="2000" spc="-1" strike="noStrike">
+              <a:rPr b="0" lang="en-US" sz="1800" spc="-1" strike="noStrike">
                 <a:latin typeface="Arial"/>
               </a:rPr>
               <a:t>Fifth Outline Level</a:t>
             </a:r>
-            <a:endParaRPr b="0" lang="en-US" sz="2000" spc="-1" strike="noStrike">
+            <a:endParaRPr b="0" lang="en-US" sz="1800" spc="-1" strike="noStrike">
               <a:latin typeface="Arial"/>
             </a:endParaRPr>
           </a:p>
           <a:p>
-            <a:pPr lvl="5" marL="2592000" indent="-216000">
+            <a:pPr lvl="5" marL="2592000" indent="-216000" algn="ctr">
               <a:spcBef>
-                <a:spcPts val="281"/>
+                <a:spcPts val="283"/>
               </a:spcBef>
               <a:buClr>
                 <a:srgbClr val="000000"/>
@@ -1575,19 +1575,19 @@
               <a:buChar char=""/>
             </a:pPr>
             <a:r>
-              <a:rPr b="0" lang="en-US" sz="2000" spc="-1" strike="noStrike">
+              <a:rPr b="0" lang="en-US" sz="1800" spc="-1" strike="noStrike">
                 <a:latin typeface="Arial"/>
               </a:rPr>
               <a:t>Sixth Outline Level</a:t>
             </a:r>
-            <a:endParaRPr b="0" lang="en-US" sz="2000" spc="-1" strike="noStrike">
+            <a:endParaRPr b="0" lang="en-US" sz="1800" spc="-1" strike="noStrike">
               <a:latin typeface="Arial"/>
             </a:endParaRPr>
           </a:p>
           <a:p>
-            <a:pPr lvl="6" marL="3024000" indent="-216000">
+            <a:pPr lvl="6" marL="3024000" indent="-216000" algn="ctr">
               <a:spcBef>
-                <a:spcPts val="281"/>
+                <a:spcPts val="283"/>
               </a:spcBef>
               <a:buClr>
                 <a:srgbClr val="000000"/>
@@ -1597,12 +1597,12 @@
               <a:buChar char=""/>
             </a:pPr>
             <a:r>
-              <a:rPr b="0" lang="en-US" sz="2000" spc="-1" strike="noStrike">
+              <a:rPr b="0" lang="en-US" sz="1800" spc="-1" strike="noStrike">
                 <a:latin typeface="Arial"/>
               </a:rPr>
               <a:t>Seventh Outline Level</a:t>
             </a:r>
-            <a:endParaRPr b="0" lang="en-US" sz="2000" spc="-1" strike="noStrike">
+            <a:endParaRPr b="0" lang="en-US" sz="1800" spc="-1" strike="noStrike">
               <a:latin typeface="Arial"/>
             </a:endParaRPr>
           </a:p>
@@ -1661,7 +1661,7 @@
         <p:spPr>
           <a:xfrm>
             <a:off x="153360" y="0"/>
-            <a:ext cx="11883600" cy="6857280"/>
+            <a:ext cx="11883240" cy="6856920"/>
           </a:xfrm>
           <a:prstGeom prst="rect">
             <a:avLst/>
@@ -1687,9 +1687,9 @@
         <p:grpSpPr>
           <a:xfrm>
             <a:off x="264240" y="51480"/>
-            <a:ext cx="4043520" cy="6846480"/>
+            <a:ext cx="4043160" cy="6846120"/>
             <a:chOff x="264240" y="51480"/>
-            <a:chExt cx="4043520" cy="6846480"/>
+            <a:chExt cx="4043160" cy="6846120"/>
           </a:xfrm>
         </p:grpSpPr>
         <p:sp>
@@ -1701,7 +1701,7 @@
           <p:spPr>
             <a:xfrm>
               <a:off x="3165840" y="1254240"/>
-              <a:ext cx="456480" cy="3120120"/>
+              <a:ext cx="456120" cy="3119760"/>
             </a:xfrm>
             <a:custGeom>
               <a:avLst/>
@@ -1751,7 +1751,7 @@
           <p:spPr>
             <a:xfrm>
               <a:off x="3165840" y="1254240"/>
-              <a:ext cx="456480" cy="2414520"/>
+              <a:ext cx="456120" cy="2414160"/>
             </a:xfrm>
             <a:custGeom>
               <a:avLst/>
@@ -1801,7 +1801,7 @@
           <p:spPr>
             <a:xfrm>
               <a:off x="3165840" y="1254240"/>
-              <a:ext cx="456480" cy="1708920"/>
+              <a:ext cx="456120" cy="1708560"/>
             </a:xfrm>
             <a:custGeom>
               <a:avLst/>
@@ -1851,7 +1851,7 @@
           <p:spPr>
             <a:xfrm>
               <a:off x="3165840" y="1254240"/>
-              <a:ext cx="456480" cy="1003320"/>
+              <a:ext cx="456120" cy="1002960"/>
             </a:xfrm>
             <a:custGeom>
               <a:avLst/>
@@ -1901,7 +1901,7 @@
           <p:spPr>
             <a:xfrm>
               <a:off x="3165840" y="1254240"/>
-              <a:ext cx="456480" cy="297720"/>
+              <a:ext cx="456120" cy="297360"/>
             </a:xfrm>
             <a:custGeom>
               <a:avLst/>
@@ -1951,7 +1951,7 @@
           <p:spPr>
             <a:xfrm>
               <a:off x="1963440" y="548640"/>
-              <a:ext cx="1202040" cy="208440"/>
+              <a:ext cx="1201680" cy="208080"/>
             </a:xfrm>
             <a:custGeom>
               <a:avLst/>
@@ -2004,7 +2004,7 @@
           <p:spPr>
             <a:xfrm>
               <a:off x="1963440" y="1254240"/>
-              <a:ext cx="456480" cy="5236560"/>
+              <a:ext cx="456120" cy="5236200"/>
             </a:xfrm>
             <a:custGeom>
               <a:avLst/>
@@ -2054,7 +2054,7 @@
           <p:spPr>
             <a:xfrm>
               <a:off x="1963440" y="1254240"/>
-              <a:ext cx="456480" cy="4530960"/>
+              <a:ext cx="456120" cy="4530600"/>
             </a:xfrm>
             <a:custGeom>
               <a:avLst/>
@@ -2104,7 +2104,7 @@
           <p:spPr>
             <a:xfrm>
               <a:off x="1963440" y="1254240"/>
-              <a:ext cx="456480" cy="3825360"/>
+              <a:ext cx="456120" cy="3825000"/>
             </a:xfrm>
             <a:custGeom>
               <a:avLst/>
@@ -2154,7 +2154,7 @@
           <p:spPr>
             <a:xfrm>
               <a:off x="1963440" y="1254240"/>
-              <a:ext cx="456480" cy="3120120"/>
+              <a:ext cx="456120" cy="3119760"/>
             </a:xfrm>
             <a:custGeom>
               <a:avLst/>
@@ -2204,7 +2204,7 @@
           <p:spPr>
             <a:xfrm>
               <a:off x="1963440" y="1254240"/>
-              <a:ext cx="456480" cy="2414520"/>
+              <a:ext cx="456120" cy="2414160"/>
             </a:xfrm>
             <a:custGeom>
               <a:avLst/>
@@ -2254,7 +2254,7 @@
           <p:spPr>
             <a:xfrm>
               <a:off x="1963440" y="1254240"/>
-              <a:ext cx="456480" cy="1708920"/>
+              <a:ext cx="456120" cy="1708560"/>
             </a:xfrm>
             <a:custGeom>
               <a:avLst/>
@@ -2304,7 +2304,7 @@
           <p:spPr>
             <a:xfrm>
               <a:off x="1963440" y="1254240"/>
-              <a:ext cx="456480" cy="1003320"/>
+              <a:ext cx="456120" cy="1002960"/>
             </a:xfrm>
             <a:custGeom>
               <a:avLst/>
@@ -2354,7 +2354,7 @@
           <p:spPr>
             <a:xfrm>
               <a:off x="1963440" y="1254240"/>
-              <a:ext cx="456480" cy="297720"/>
+              <a:ext cx="456120" cy="297360"/>
             </a:xfrm>
             <a:custGeom>
               <a:avLst/>
@@ -2404,7 +2404,7 @@
           <p:spPr>
             <a:xfrm>
               <a:off x="1917360" y="548640"/>
-              <a:ext cx="91080" cy="208440"/>
+              <a:ext cx="90720" cy="208080"/>
             </a:xfrm>
             <a:custGeom>
               <a:avLst/>
@@ -2451,7 +2451,7 @@
           <p:spPr>
             <a:xfrm>
               <a:off x="761040" y="1254240"/>
-              <a:ext cx="456480" cy="3120120"/>
+              <a:ext cx="456120" cy="3119760"/>
             </a:xfrm>
             <a:custGeom>
               <a:avLst/>
@@ -2501,7 +2501,7 @@
           <p:spPr>
             <a:xfrm>
               <a:off x="761040" y="1254240"/>
-              <a:ext cx="456480" cy="2414520"/>
+              <a:ext cx="456120" cy="2414160"/>
             </a:xfrm>
             <a:custGeom>
               <a:avLst/>
@@ -2551,7 +2551,7 @@
           <p:spPr>
             <a:xfrm>
               <a:off x="761040" y="1254240"/>
-              <a:ext cx="456480" cy="1708920"/>
+              <a:ext cx="456120" cy="1708560"/>
             </a:xfrm>
             <a:custGeom>
               <a:avLst/>
@@ -2601,7 +2601,7 @@
           <p:spPr>
             <a:xfrm>
               <a:off x="761040" y="1254240"/>
-              <a:ext cx="456480" cy="1003320"/>
+              <a:ext cx="456120" cy="1002960"/>
             </a:xfrm>
             <a:custGeom>
               <a:avLst/>
@@ -2651,7 +2651,7 @@
           <p:spPr>
             <a:xfrm>
               <a:off x="761040" y="1254240"/>
-              <a:ext cx="456480" cy="297720"/>
+              <a:ext cx="456120" cy="297360"/>
             </a:xfrm>
             <a:custGeom>
               <a:avLst/>
@@ -2701,7 +2701,7 @@
           <p:spPr>
             <a:xfrm>
               <a:off x="761040" y="548640"/>
-              <a:ext cx="1201680" cy="208440"/>
+              <a:ext cx="1201320" cy="208080"/>
             </a:xfrm>
             <a:custGeom>
               <a:avLst/>
@@ -2754,7 +2754,7 @@
           <p:spPr>
             <a:xfrm>
               <a:off x="1714680" y="51480"/>
-              <a:ext cx="496440" cy="496440"/>
+              <a:ext cx="496080" cy="496080"/>
             </a:xfrm>
             <a:prstGeom prst="arc">
               <a:avLst>
@@ -2791,7 +2791,7 @@
           <p:spPr>
             <a:xfrm>
               <a:off x="1714680" y="51480"/>
-              <a:ext cx="496440" cy="496440"/>
+              <a:ext cx="496080" cy="496080"/>
             </a:xfrm>
             <a:prstGeom prst="arc">
               <a:avLst>
@@ -2828,7 +2828,7 @@
           <p:spPr>
             <a:xfrm>
               <a:off x="1466640" y="141120"/>
-              <a:ext cx="993240" cy="317520"/>
+              <a:ext cx="992880" cy="317160"/>
             </a:xfrm>
             <a:prstGeom prst="rect">
               <a:avLst/>
@@ -2882,7 +2882,7 @@
           <p:spPr>
             <a:xfrm>
               <a:off x="512280" y="757080"/>
-              <a:ext cx="496440" cy="496440"/>
+              <a:ext cx="496080" cy="496080"/>
             </a:xfrm>
             <a:prstGeom prst="arc">
               <a:avLst>
@@ -2919,7 +2919,7 @@
           <p:spPr>
             <a:xfrm>
               <a:off x="512280" y="757080"/>
-              <a:ext cx="496440" cy="496440"/>
+              <a:ext cx="496080" cy="496080"/>
             </a:xfrm>
             <a:prstGeom prst="arc">
               <a:avLst>
@@ -2956,7 +2956,7 @@
           <p:spPr>
             <a:xfrm>
               <a:off x="264240" y="846720"/>
-              <a:ext cx="992880" cy="317520"/>
+              <a:ext cx="992520" cy="317160"/>
             </a:xfrm>
             <a:prstGeom prst="rect">
               <a:avLst/>
@@ -2993,7 +2993,7 @@
                   <a:latin typeface="Arial"/>
                   <a:ea typeface="DejaVu Sans"/>
                 </a:rPr>
-                <a:t>Estekbal</a:t>
+                <a:t>Admissions</a:t>
               </a:r>
               <a:endParaRPr b="0" lang="en-US" sz="1000" spc="-1" strike="noStrike">
                 <a:latin typeface="Arial"/>
@@ -3010,7 +3010,7 @@
           <p:spPr>
             <a:xfrm>
               <a:off x="1158480" y="1462680"/>
-              <a:ext cx="496080" cy="496440"/>
+              <a:ext cx="495720" cy="496080"/>
             </a:xfrm>
             <a:prstGeom prst="arc">
               <a:avLst>
@@ -3047,7 +3047,7 @@
           <p:spPr>
             <a:xfrm>
               <a:off x="1158480" y="1462680"/>
-              <a:ext cx="496080" cy="496440"/>
+              <a:ext cx="495720" cy="496080"/>
             </a:xfrm>
             <a:prstGeom prst="arc">
               <a:avLst>
@@ -3084,7 +3084,7 @@
           <p:spPr>
             <a:xfrm>
               <a:off x="909720" y="1552320"/>
-              <a:ext cx="993240" cy="317520"/>
+              <a:ext cx="992880" cy="317160"/>
             </a:xfrm>
             <a:prstGeom prst="rect">
               <a:avLst/>
@@ -3121,7 +3121,7 @@
                   <a:latin typeface="Arial"/>
                   <a:ea typeface="DejaVu Sans"/>
                 </a:rPr>
-                <a:t>Defibraillator</a:t>
+                <a:t>Defibrillator</a:t>
               </a:r>
               <a:endParaRPr b="0" lang="en-US" sz="1000" spc="-1" strike="noStrike">
                 <a:latin typeface="Arial"/>
@@ -3138,7 +3138,7 @@
           <p:spPr>
             <a:xfrm>
               <a:off x="1158480" y="2168280"/>
-              <a:ext cx="496080" cy="496440"/>
+              <a:ext cx="495720" cy="496080"/>
             </a:xfrm>
             <a:prstGeom prst="arc">
               <a:avLst>
@@ -3175,7 +3175,7 @@
           <p:spPr>
             <a:xfrm>
               <a:off x="1158480" y="2168280"/>
-              <a:ext cx="496080" cy="496440"/>
+              <a:ext cx="495720" cy="496080"/>
             </a:xfrm>
             <a:prstGeom prst="arc">
               <a:avLst>
@@ -3212,7 +3212,7 @@
           <p:spPr>
             <a:xfrm>
               <a:off x="909720" y="2257920"/>
-              <a:ext cx="993240" cy="317520"/>
+              <a:ext cx="992880" cy="317160"/>
             </a:xfrm>
             <a:prstGeom prst="rect">
               <a:avLst/>
@@ -3266,7 +3266,7 @@
           <p:spPr>
             <a:xfrm>
               <a:off x="1158480" y="2873880"/>
-              <a:ext cx="496080" cy="496440"/>
+              <a:ext cx="495720" cy="496080"/>
             </a:xfrm>
             <a:prstGeom prst="arc">
               <a:avLst>
@@ -3303,7 +3303,7 @@
           <p:spPr>
             <a:xfrm>
               <a:off x="1158480" y="2873880"/>
-              <a:ext cx="496080" cy="496440"/>
+              <a:ext cx="495720" cy="496080"/>
             </a:xfrm>
             <a:prstGeom prst="arc">
               <a:avLst>
@@ -3340,7 +3340,7 @@
           <p:spPr>
             <a:xfrm>
               <a:off x="909720" y="2963160"/>
-              <a:ext cx="993240" cy="317520"/>
+              <a:ext cx="992880" cy="317160"/>
             </a:xfrm>
             <a:prstGeom prst="rect">
               <a:avLst/>
@@ -3394,7 +3394,7 @@
           <p:spPr>
             <a:xfrm>
               <a:off x="1158480" y="3579480"/>
-              <a:ext cx="496080" cy="496440"/>
+              <a:ext cx="495720" cy="496080"/>
             </a:xfrm>
             <a:prstGeom prst="arc">
               <a:avLst>
@@ -3431,7 +3431,7 @@
           <p:spPr>
             <a:xfrm>
               <a:off x="1158480" y="3579480"/>
-              <a:ext cx="496080" cy="496440"/>
+              <a:ext cx="495720" cy="496080"/>
             </a:xfrm>
             <a:prstGeom prst="arc">
               <a:avLst>
@@ -3468,7 +3468,7 @@
           <p:spPr>
             <a:xfrm>
               <a:off x="909720" y="3668760"/>
-              <a:ext cx="993240" cy="317520"/>
+              <a:ext cx="992880" cy="317160"/>
             </a:xfrm>
             <a:prstGeom prst="rect">
               <a:avLst/>
@@ -3522,7 +3522,7 @@
           <p:spPr>
             <a:xfrm>
               <a:off x="1158480" y="4285080"/>
-              <a:ext cx="496080" cy="496440"/>
+              <a:ext cx="495720" cy="496080"/>
             </a:xfrm>
             <a:prstGeom prst="arc">
               <a:avLst>
@@ -3559,7 +3559,7 @@
           <p:spPr>
             <a:xfrm>
               <a:off x="1158480" y="4285080"/>
-              <a:ext cx="496080" cy="496440"/>
+              <a:ext cx="495720" cy="496080"/>
             </a:xfrm>
             <a:prstGeom prst="arc">
               <a:avLst>
@@ -3596,7 +3596,7 @@
           <p:spPr>
             <a:xfrm>
               <a:off x="909720" y="4374360"/>
-              <a:ext cx="993240" cy="317520"/>
+              <a:ext cx="992880" cy="317160"/>
             </a:xfrm>
             <a:prstGeom prst="rect">
               <a:avLst/>
@@ -3650,7 +3650,7 @@
           <p:spPr>
             <a:xfrm>
               <a:off x="1714680" y="757080"/>
-              <a:ext cx="496440" cy="496440"/>
+              <a:ext cx="496080" cy="496080"/>
             </a:xfrm>
             <a:prstGeom prst="arc">
               <a:avLst>
@@ -3687,7 +3687,7 @@
           <p:spPr>
             <a:xfrm>
               <a:off x="1714680" y="757080"/>
-              <a:ext cx="496440" cy="496440"/>
+              <a:ext cx="496080" cy="496080"/>
             </a:xfrm>
             <a:prstGeom prst="arc">
               <a:avLst>
@@ -3724,7 +3724,7 @@
           <p:spPr>
             <a:xfrm>
               <a:off x="1466640" y="846720"/>
-              <a:ext cx="993240" cy="317520"/>
+              <a:ext cx="992880" cy="317160"/>
             </a:xfrm>
             <a:prstGeom prst="rect">
               <a:avLst/>
@@ -3778,7 +3778,7 @@
           <p:spPr>
             <a:xfrm>
               <a:off x="2360880" y="1462680"/>
-              <a:ext cx="496440" cy="496440"/>
+              <a:ext cx="496080" cy="496080"/>
             </a:xfrm>
             <a:prstGeom prst="arc">
               <a:avLst>
@@ -3815,7 +3815,7 @@
           <p:spPr>
             <a:xfrm>
               <a:off x="2360880" y="1462680"/>
-              <a:ext cx="496440" cy="496440"/>
+              <a:ext cx="496080" cy="496080"/>
             </a:xfrm>
             <a:prstGeom prst="arc">
               <a:avLst>
@@ -3852,7 +3852,7 @@
           <p:spPr>
             <a:xfrm>
               <a:off x="2112120" y="1552320"/>
-              <a:ext cx="993240" cy="317520"/>
+              <a:ext cx="992880" cy="317160"/>
             </a:xfrm>
             <a:prstGeom prst="rect">
               <a:avLst/>
@@ -3906,7 +3906,7 @@
           <p:spPr>
             <a:xfrm>
               <a:off x="2360880" y="2168280"/>
-              <a:ext cx="496440" cy="496440"/>
+              <a:ext cx="496080" cy="496080"/>
             </a:xfrm>
             <a:prstGeom prst="arc">
               <a:avLst>
@@ -3943,7 +3943,7 @@
           <p:spPr>
             <a:xfrm>
               <a:off x="2360880" y="2168280"/>
-              <a:ext cx="496440" cy="496440"/>
+              <a:ext cx="496080" cy="496080"/>
             </a:xfrm>
             <a:prstGeom prst="arc">
               <a:avLst>
@@ -3980,7 +3980,7 @@
           <p:spPr>
             <a:xfrm>
               <a:off x="2112120" y="2257920"/>
-              <a:ext cx="993240" cy="317520"/>
+              <a:ext cx="992880" cy="317160"/>
             </a:xfrm>
             <a:prstGeom prst="rect">
               <a:avLst/>
@@ -4034,7 +4034,7 @@
           <p:spPr>
             <a:xfrm>
               <a:off x="2360880" y="2873880"/>
-              <a:ext cx="496440" cy="496440"/>
+              <a:ext cx="496080" cy="496080"/>
             </a:xfrm>
             <a:prstGeom prst="arc">
               <a:avLst>
@@ -4071,7 +4071,7 @@
           <p:spPr>
             <a:xfrm>
               <a:off x="2360880" y="2873880"/>
-              <a:ext cx="496440" cy="496440"/>
+              <a:ext cx="496080" cy="496080"/>
             </a:xfrm>
             <a:prstGeom prst="arc">
               <a:avLst>
@@ -4108,7 +4108,7 @@
           <p:spPr>
             <a:xfrm>
               <a:off x="2112120" y="2963160"/>
-              <a:ext cx="993240" cy="317520"/>
+              <a:ext cx="992880" cy="317160"/>
             </a:xfrm>
             <a:prstGeom prst="rect">
               <a:avLst/>
@@ -4162,7 +4162,7 @@
           <p:spPr>
             <a:xfrm>
               <a:off x="2360880" y="3579480"/>
-              <a:ext cx="496440" cy="496440"/>
+              <a:ext cx="496080" cy="496080"/>
             </a:xfrm>
             <a:prstGeom prst="arc">
               <a:avLst>
@@ -4199,7 +4199,7 @@
           <p:spPr>
             <a:xfrm>
               <a:off x="2360880" y="3579480"/>
-              <a:ext cx="496440" cy="496440"/>
+              <a:ext cx="496080" cy="496080"/>
             </a:xfrm>
             <a:prstGeom prst="arc">
               <a:avLst>
@@ -4236,7 +4236,7 @@
           <p:spPr>
             <a:xfrm>
               <a:off x="2112120" y="3668760"/>
-              <a:ext cx="993240" cy="317520"/>
+              <a:ext cx="992880" cy="317160"/>
             </a:xfrm>
             <a:prstGeom prst="rect">
               <a:avLst/>
@@ -4290,7 +4290,7 @@
           <p:spPr>
             <a:xfrm>
               <a:off x="2360880" y="4285080"/>
-              <a:ext cx="496440" cy="496440"/>
+              <a:ext cx="496080" cy="496080"/>
             </a:xfrm>
             <a:prstGeom prst="arc">
               <a:avLst>
@@ -4327,7 +4327,7 @@
           <p:spPr>
             <a:xfrm>
               <a:off x="2360880" y="4285080"/>
-              <a:ext cx="496440" cy="496440"/>
+              <a:ext cx="496080" cy="496080"/>
             </a:xfrm>
             <a:prstGeom prst="arc">
               <a:avLst>
@@ -4364,7 +4364,7 @@
           <p:spPr>
             <a:xfrm>
               <a:off x="2112120" y="4374360"/>
-              <a:ext cx="993240" cy="317520"/>
+              <a:ext cx="992880" cy="317160"/>
             </a:xfrm>
             <a:prstGeom prst="rect">
               <a:avLst/>
@@ -4418,7 +4418,7 @@
           <p:spPr>
             <a:xfrm>
               <a:off x="2360880" y="4990680"/>
-              <a:ext cx="496440" cy="496440"/>
+              <a:ext cx="496080" cy="496080"/>
             </a:xfrm>
             <a:prstGeom prst="arc">
               <a:avLst>
@@ -4455,7 +4455,7 @@
           <p:spPr>
             <a:xfrm>
               <a:off x="2360880" y="4990680"/>
-              <a:ext cx="496440" cy="496440"/>
+              <a:ext cx="496080" cy="496080"/>
             </a:xfrm>
             <a:prstGeom prst="arc">
               <a:avLst>
@@ -4492,7 +4492,7 @@
           <p:spPr>
             <a:xfrm>
               <a:off x="2112120" y="5079960"/>
-              <a:ext cx="993240" cy="317520"/>
+              <a:ext cx="992880" cy="317160"/>
             </a:xfrm>
             <a:prstGeom prst="rect">
               <a:avLst/>
@@ -4546,7 +4546,7 @@
           <p:spPr>
             <a:xfrm>
               <a:off x="2360880" y="5695920"/>
-              <a:ext cx="496440" cy="496440"/>
+              <a:ext cx="496080" cy="496080"/>
             </a:xfrm>
             <a:prstGeom prst="arc">
               <a:avLst>
@@ -4583,7 +4583,7 @@
           <p:spPr>
             <a:xfrm>
               <a:off x="2360880" y="5695920"/>
-              <a:ext cx="496440" cy="496440"/>
+              <a:ext cx="496080" cy="496080"/>
             </a:xfrm>
             <a:prstGeom prst="arc">
               <a:avLst>
@@ -4620,7 +4620,7 @@
           <p:spPr>
             <a:xfrm>
               <a:off x="2112120" y="5785560"/>
-              <a:ext cx="993240" cy="317520"/>
+              <a:ext cx="992880" cy="317160"/>
             </a:xfrm>
             <a:prstGeom prst="rect">
               <a:avLst/>
@@ -4674,7 +4674,7 @@
           <p:spPr>
             <a:xfrm>
               <a:off x="2360880" y="6401520"/>
-              <a:ext cx="496440" cy="496440"/>
+              <a:ext cx="496080" cy="496080"/>
             </a:xfrm>
             <a:prstGeom prst="arc">
               <a:avLst>
@@ -4711,7 +4711,7 @@
           <p:spPr>
             <a:xfrm>
               <a:off x="2360880" y="6401520"/>
-              <a:ext cx="496440" cy="496440"/>
+              <a:ext cx="496080" cy="496080"/>
             </a:xfrm>
             <a:prstGeom prst="arc">
               <a:avLst>
@@ -4748,7 +4748,7 @@
           <p:spPr>
             <a:xfrm>
               <a:off x="2112120" y="6491160"/>
-              <a:ext cx="993240" cy="317520"/>
+              <a:ext cx="992880" cy="317160"/>
             </a:xfrm>
             <a:prstGeom prst="rect">
               <a:avLst/>
@@ -4802,7 +4802,7 @@
           <p:spPr>
             <a:xfrm>
               <a:off x="2917080" y="757080"/>
-              <a:ext cx="496440" cy="496440"/>
+              <a:ext cx="496080" cy="496080"/>
             </a:xfrm>
             <a:prstGeom prst="arc">
               <a:avLst>
@@ -4839,7 +4839,7 @@
           <p:spPr>
             <a:xfrm>
               <a:off x="2917080" y="757080"/>
-              <a:ext cx="496440" cy="496440"/>
+              <a:ext cx="496080" cy="496080"/>
             </a:xfrm>
             <a:prstGeom prst="arc">
               <a:avLst>
@@ -4876,7 +4876,7 @@
           <p:spPr>
             <a:xfrm>
               <a:off x="2669040" y="846720"/>
-              <a:ext cx="993240" cy="317520"/>
+              <a:ext cx="992880" cy="317160"/>
             </a:xfrm>
             <a:prstGeom prst="rect">
               <a:avLst/>
@@ -4930,7 +4930,7 @@
           <p:spPr>
             <a:xfrm>
               <a:off x="3563280" y="1462680"/>
-              <a:ext cx="496440" cy="496440"/>
+              <a:ext cx="496080" cy="496080"/>
             </a:xfrm>
             <a:prstGeom prst="arc">
               <a:avLst>
@@ -4967,7 +4967,7 @@
           <p:spPr>
             <a:xfrm>
               <a:off x="3563280" y="1462680"/>
-              <a:ext cx="496440" cy="496440"/>
+              <a:ext cx="496080" cy="496080"/>
             </a:xfrm>
             <a:prstGeom prst="arc">
               <a:avLst>
@@ -5004,7 +5004,7 @@
           <p:spPr>
             <a:xfrm>
               <a:off x="3314520" y="1552320"/>
-              <a:ext cx="993240" cy="317520"/>
+              <a:ext cx="992880" cy="317160"/>
             </a:xfrm>
             <a:prstGeom prst="rect">
               <a:avLst/>
@@ -5058,7 +5058,7 @@
           <p:spPr>
             <a:xfrm>
               <a:off x="3563280" y="2168280"/>
-              <a:ext cx="496440" cy="496440"/>
+              <a:ext cx="496080" cy="496080"/>
             </a:xfrm>
             <a:prstGeom prst="arc">
               <a:avLst>
@@ -5095,7 +5095,7 @@
           <p:spPr>
             <a:xfrm>
               <a:off x="3563280" y="2168280"/>
-              <a:ext cx="496440" cy="496440"/>
+              <a:ext cx="496080" cy="496080"/>
             </a:xfrm>
             <a:prstGeom prst="arc">
               <a:avLst>
@@ -5132,7 +5132,7 @@
           <p:spPr>
             <a:xfrm>
               <a:off x="3314520" y="2257920"/>
-              <a:ext cx="993240" cy="317520"/>
+              <a:ext cx="992880" cy="317160"/>
             </a:xfrm>
             <a:prstGeom prst="rect">
               <a:avLst/>
@@ -5186,7 +5186,7 @@
           <p:spPr>
             <a:xfrm>
               <a:off x="3563280" y="2873880"/>
-              <a:ext cx="496440" cy="496440"/>
+              <a:ext cx="496080" cy="496080"/>
             </a:xfrm>
             <a:prstGeom prst="arc">
               <a:avLst>
@@ -5223,7 +5223,7 @@
           <p:spPr>
             <a:xfrm>
               <a:off x="3563280" y="2873880"/>
-              <a:ext cx="496440" cy="496440"/>
+              <a:ext cx="496080" cy="496080"/>
             </a:xfrm>
             <a:prstGeom prst="arc">
               <a:avLst>
@@ -5260,7 +5260,7 @@
           <p:spPr>
             <a:xfrm>
               <a:off x="3314520" y="2963160"/>
-              <a:ext cx="993240" cy="317520"/>
+              <a:ext cx="992880" cy="317160"/>
             </a:xfrm>
             <a:prstGeom prst="rect">
               <a:avLst/>
@@ -5314,7 +5314,7 @@
           <p:spPr>
             <a:xfrm>
               <a:off x="3563280" y="3579480"/>
-              <a:ext cx="496440" cy="496440"/>
+              <a:ext cx="496080" cy="496080"/>
             </a:xfrm>
             <a:prstGeom prst="arc">
               <a:avLst>
@@ -5351,7 +5351,7 @@
           <p:spPr>
             <a:xfrm>
               <a:off x="3563280" y="3579480"/>
-              <a:ext cx="496440" cy="496440"/>
+              <a:ext cx="496080" cy="496080"/>
             </a:xfrm>
             <a:prstGeom prst="arc">
               <a:avLst>
@@ -5388,7 +5388,7 @@
           <p:spPr>
             <a:xfrm>
               <a:off x="3314520" y="3668760"/>
-              <a:ext cx="993240" cy="317520"/>
+              <a:ext cx="992880" cy="317160"/>
             </a:xfrm>
             <a:prstGeom prst="rect">
               <a:avLst/>
@@ -5442,7 +5442,7 @@
           <p:spPr>
             <a:xfrm>
               <a:off x="3563280" y="4285080"/>
-              <a:ext cx="496440" cy="496440"/>
+              <a:ext cx="496080" cy="496080"/>
             </a:xfrm>
             <a:prstGeom prst="arc">
               <a:avLst>
@@ -5479,7 +5479,7 @@
           <p:spPr>
             <a:xfrm>
               <a:off x="3563280" y="4285080"/>
-              <a:ext cx="496440" cy="496440"/>
+              <a:ext cx="496080" cy="496080"/>
             </a:xfrm>
             <a:prstGeom prst="arc">
               <a:avLst>
@@ -5516,7 +5516,7 @@
           <p:spPr>
             <a:xfrm>
               <a:off x="3314520" y="4374360"/>
-              <a:ext cx="993240" cy="317520"/>
+              <a:ext cx="992880" cy="317160"/>
             </a:xfrm>
             <a:prstGeom prst="rect">
               <a:avLst/>

</xml_diff>